<commit_message>
0308 @ thu working on traslateing chap 04
</commit_message>
<xml_diff>
--- a/Latex/figures/ch3/fig.pptx
+++ b/Latex/figures/ch3/fig.pptx
@@ -6,6 +6,8 @@
   </p:sldMasterIdLst>
   <p:sldIdLst>
     <p:sldId id="256" r:id="rId2"/>
+    <p:sldId id="257" r:id="rId3"/>
+    <p:sldId id="258" r:id="rId4"/>
   </p:sldIdLst>
   <p:sldSz cx="12192000" cy="6858000"/>
   <p:notesSz cx="6858000" cy="9144000"/>
@@ -104,6 +106,11 @@
       </a:defRPr>
     </a:lvl9pPr>
   </p:defaultTextStyle>
+  <p:extLst>
+    <p:ext uri="{EFAFB233-063F-42B5-8137-9DF3F51BA10A}">
+      <p15:sldGuideLst xmlns:p15="http://schemas.microsoft.com/office/powerpoint/2012/main"/>
+    </p:ext>
+  </p:extLst>
 </p:presentation>
 </file>
 
@@ -238,7 +245,7 @@
           <a:p>
             <a:fld id="{FF2635B8-D23D-4443-ABE1-E82369BC2EC3}" type="datetimeFigureOut">
               <a:rPr lang="zh-CN" altLang="en-US" smtClean="0"/>
-              <a:t>2016/3/7</a:t>
+              <a:t>2016/3/8</a:t>
             </a:fld>
             <a:endParaRPr lang="zh-CN" altLang="en-US"/>
           </a:p>
@@ -408,7 +415,7 @@
           <a:p>
             <a:fld id="{FF2635B8-D23D-4443-ABE1-E82369BC2EC3}" type="datetimeFigureOut">
               <a:rPr lang="zh-CN" altLang="en-US" smtClean="0"/>
-              <a:t>2016/3/7</a:t>
+              <a:t>2016/3/8</a:t>
             </a:fld>
             <a:endParaRPr lang="zh-CN" altLang="en-US"/>
           </a:p>
@@ -588,7 +595,7 @@
           <a:p>
             <a:fld id="{FF2635B8-D23D-4443-ABE1-E82369BC2EC3}" type="datetimeFigureOut">
               <a:rPr lang="zh-CN" altLang="en-US" smtClean="0"/>
-              <a:t>2016/3/7</a:t>
+              <a:t>2016/3/8</a:t>
             </a:fld>
             <a:endParaRPr lang="zh-CN" altLang="en-US"/>
           </a:p>
@@ -758,7 +765,7 @@
           <a:p>
             <a:fld id="{FF2635B8-D23D-4443-ABE1-E82369BC2EC3}" type="datetimeFigureOut">
               <a:rPr lang="zh-CN" altLang="en-US" smtClean="0"/>
-              <a:t>2016/3/7</a:t>
+              <a:t>2016/3/8</a:t>
             </a:fld>
             <a:endParaRPr lang="zh-CN" altLang="en-US"/>
           </a:p>
@@ -1004,7 +1011,7 @@
           <a:p>
             <a:fld id="{FF2635B8-D23D-4443-ABE1-E82369BC2EC3}" type="datetimeFigureOut">
               <a:rPr lang="zh-CN" altLang="en-US" smtClean="0"/>
-              <a:t>2016/3/7</a:t>
+              <a:t>2016/3/8</a:t>
             </a:fld>
             <a:endParaRPr lang="zh-CN" altLang="en-US"/>
           </a:p>
@@ -1236,7 +1243,7 @@
           <a:p>
             <a:fld id="{FF2635B8-D23D-4443-ABE1-E82369BC2EC3}" type="datetimeFigureOut">
               <a:rPr lang="zh-CN" altLang="en-US" smtClean="0"/>
-              <a:t>2016/3/7</a:t>
+              <a:t>2016/3/8</a:t>
             </a:fld>
             <a:endParaRPr lang="zh-CN" altLang="en-US"/>
           </a:p>
@@ -1603,7 +1610,7 @@
           <a:p>
             <a:fld id="{FF2635B8-D23D-4443-ABE1-E82369BC2EC3}" type="datetimeFigureOut">
               <a:rPr lang="zh-CN" altLang="en-US" smtClean="0"/>
-              <a:t>2016/3/7</a:t>
+              <a:t>2016/3/8</a:t>
             </a:fld>
             <a:endParaRPr lang="zh-CN" altLang="en-US"/>
           </a:p>
@@ -1721,7 +1728,7 @@
           <a:p>
             <a:fld id="{FF2635B8-D23D-4443-ABE1-E82369BC2EC3}" type="datetimeFigureOut">
               <a:rPr lang="zh-CN" altLang="en-US" smtClean="0"/>
-              <a:t>2016/3/7</a:t>
+              <a:t>2016/3/8</a:t>
             </a:fld>
             <a:endParaRPr lang="zh-CN" altLang="en-US"/>
           </a:p>
@@ -1816,7 +1823,7 @@
           <a:p>
             <a:fld id="{FF2635B8-D23D-4443-ABE1-E82369BC2EC3}" type="datetimeFigureOut">
               <a:rPr lang="zh-CN" altLang="en-US" smtClean="0"/>
-              <a:t>2016/3/7</a:t>
+              <a:t>2016/3/8</a:t>
             </a:fld>
             <a:endParaRPr lang="zh-CN" altLang="en-US"/>
           </a:p>
@@ -2093,7 +2100,7 @@
           <a:p>
             <a:fld id="{FF2635B8-D23D-4443-ABE1-E82369BC2EC3}" type="datetimeFigureOut">
               <a:rPr lang="zh-CN" altLang="en-US" smtClean="0"/>
-              <a:t>2016/3/7</a:t>
+              <a:t>2016/3/8</a:t>
             </a:fld>
             <a:endParaRPr lang="zh-CN" altLang="en-US"/>
           </a:p>
@@ -2346,7 +2353,7 @@
           <a:p>
             <a:fld id="{FF2635B8-D23D-4443-ABE1-E82369BC2EC3}" type="datetimeFigureOut">
               <a:rPr lang="zh-CN" altLang="en-US" smtClean="0"/>
-              <a:t>2016/3/7</a:t>
+              <a:t>2016/3/8</a:t>
             </a:fld>
             <a:endParaRPr lang="zh-CN" altLang="en-US"/>
           </a:p>
@@ -2559,7 +2566,7 @@
           <a:p>
             <a:fld id="{FF2635B8-D23D-4443-ABE1-E82369BC2EC3}" type="datetimeFigureOut">
               <a:rPr lang="zh-CN" altLang="en-US" smtClean="0"/>
-              <a:t>2016/3/7</a:t>
+              <a:t>2016/3/8</a:t>
             </a:fld>
             <a:endParaRPr lang="zh-CN" altLang="en-US"/>
           </a:p>
@@ -3530,6 +3537,346 @@
 </p:sld>
 </file>
 
+<file path=ppt/slides/slide2.xml><?xml version="1.0" encoding="utf-8"?>
+<p:sld xmlns:a="http://schemas.openxmlformats.org/drawingml/2006/main" xmlns:r="http://schemas.openxmlformats.org/officeDocument/2006/relationships" xmlns:p="http://schemas.openxmlformats.org/presentationml/2006/main">
+  <p:cSld>
+    <p:spTree>
+      <p:nvGrpSpPr>
+        <p:cNvPr id="1" name=""/>
+        <p:cNvGrpSpPr/>
+        <p:nvPr/>
+      </p:nvGrpSpPr>
+      <p:grpSpPr>
+        <a:xfrm>
+          <a:off x="0" y="0"/>
+          <a:ext cx="0" cy="0"/>
+          <a:chOff x="0" y="0"/>
+          <a:chExt cx="0" cy="0"/>
+        </a:xfrm>
+      </p:grpSpPr>
+      <p:sp>
+        <p:nvSpPr>
+          <p:cNvPr id="2" name="标题 1"/>
+          <p:cNvSpPr>
+            <a:spLocks noGrp="1"/>
+          </p:cNvSpPr>
+          <p:nvPr>
+            <p:ph type="title"/>
+          </p:nvPr>
+        </p:nvSpPr>
+        <p:spPr/>
+        <p:txBody>
+          <a:bodyPr/>
+          <a:lstStyle/>
+          <a:p>
+            <a:endParaRPr lang="zh-CN" altLang="en-US"/>
+          </a:p>
+        </p:txBody>
+      </p:sp>
+      <p:pic>
+        <p:nvPicPr>
+          <p:cNvPr id="6" name="内容占位符 5"/>
+          <p:cNvPicPr>
+            <a:picLocks noGrp="1" noChangeAspect="1"/>
+          </p:cNvPicPr>
+          <p:nvPr>
+            <p:ph idx="1"/>
+          </p:nvPr>
+        </p:nvPicPr>
+        <p:blipFill>
+          <a:blip r:embed="rId2">
+            <a:extLst>
+              <a:ext uri="{28A0092B-C50C-407E-A947-70E740481C1C}">
+                <a14:useLocalDpi xmlns:a14="http://schemas.microsoft.com/office/drawing/2010/main" val="0"/>
+              </a:ext>
+            </a:extLst>
+          </a:blip>
+          <a:stretch>
+            <a:fillRect/>
+          </a:stretch>
+        </p:blipFill>
+        <p:spPr>
+          <a:xfrm>
+            <a:off x="2327934" y="2126533"/>
+            <a:ext cx="1419225" cy="3000375"/>
+          </a:xfrm>
+        </p:spPr>
+      </p:pic>
+      <p:pic>
+        <p:nvPicPr>
+          <p:cNvPr id="7" name="图片 6"/>
+          <p:cNvPicPr>
+            <a:picLocks noChangeAspect="1"/>
+          </p:cNvPicPr>
+          <p:nvPr/>
+        </p:nvPicPr>
+        <p:blipFill>
+          <a:blip r:embed="rId3">
+            <a:extLst>
+              <a:ext uri="{28A0092B-C50C-407E-A947-70E740481C1C}">
+                <a14:useLocalDpi xmlns:a14="http://schemas.microsoft.com/office/drawing/2010/main" val="0"/>
+              </a:ext>
+            </a:extLst>
+          </a:blip>
+          <a:stretch>
+            <a:fillRect/>
+          </a:stretch>
+        </p:blipFill>
+        <p:spPr>
+          <a:xfrm>
+            <a:off x="6232568" y="2126531"/>
+            <a:ext cx="1419225" cy="3000375"/>
+          </a:xfrm>
+          <a:prstGeom prst="rect">
+            <a:avLst/>
+          </a:prstGeom>
+        </p:spPr>
+      </p:pic>
+      <p:pic>
+        <p:nvPicPr>
+          <p:cNvPr id="8" name="图片 7"/>
+          <p:cNvPicPr>
+            <a:picLocks noChangeAspect="1"/>
+          </p:cNvPicPr>
+          <p:nvPr/>
+        </p:nvPicPr>
+        <p:blipFill>
+          <a:blip r:embed="rId4">
+            <a:extLst>
+              <a:ext uri="{28A0092B-C50C-407E-A947-70E740481C1C}">
+                <a14:useLocalDpi xmlns:a14="http://schemas.microsoft.com/office/drawing/2010/main" val="0"/>
+              </a:ext>
+            </a:extLst>
+          </a:blip>
+          <a:stretch>
+            <a:fillRect/>
+          </a:stretch>
+        </p:blipFill>
+        <p:spPr>
+          <a:xfrm>
+            <a:off x="4375379" y="2126532"/>
+            <a:ext cx="1419225" cy="3000375"/>
+          </a:xfrm>
+          <a:prstGeom prst="rect">
+            <a:avLst/>
+          </a:prstGeom>
+        </p:spPr>
+      </p:pic>
+    </p:spTree>
+    <p:extLst>
+      <p:ext uri="{BB962C8B-B14F-4D97-AF65-F5344CB8AC3E}">
+        <p14:creationId xmlns:p14="http://schemas.microsoft.com/office/powerpoint/2010/main" val="1212995801"/>
+      </p:ext>
+    </p:extLst>
+  </p:cSld>
+  <p:clrMapOvr>
+    <a:masterClrMapping/>
+  </p:clrMapOvr>
+</p:sld>
+</file>
+
+<file path=ppt/slides/slide3.xml><?xml version="1.0" encoding="utf-8"?>
+<p:sld xmlns:a="http://schemas.openxmlformats.org/drawingml/2006/main" xmlns:r="http://schemas.openxmlformats.org/officeDocument/2006/relationships" xmlns:p="http://schemas.openxmlformats.org/presentationml/2006/main">
+  <p:cSld>
+    <p:spTree>
+      <p:nvGrpSpPr>
+        <p:cNvPr id="1" name=""/>
+        <p:cNvGrpSpPr/>
+        <p:nvPr/>
+      </p:nvGrpSpPr>
+      <p:grpSpPr>
+        <a:xfrm>
+          <a:off x="0" y="0"/>
+          <a:ext cx="0" cy="0"/>
+          <a:chOff x="0" y="0"/>
+          <a:chExt cx="0" cy="0"/>
+        </a:xfrm>
+      </p:grpSpPr>
+      <p:sp>
+        <p:nvSpPr>
+          <p:cNvPr id="2" name="标题 1"/>
+          <p:cNvSpPr>
+            <a:spLocks noGrp="1"/>
+          </p:cNvSpPr>
+          <p:nvPr>
+            <p:ph type="title"/>
+          </p:nvPr>
+        </p:nvSpPr>
+        <p:spPr/>
+        <p:txBody>
+          <a:bodyPr/>
+          <a:lstStyle/>
+          <a:p>
+            <a:endParaRPr lang="zh-CN" altLang="en-US"/>
+          </a:p>
+        </p:txBody>
+      </p:sp>
+      <p:graphicFrame>
+        <p:nvGraphicFramePr>
+          <p:cNvPr id="13" name="对象 12"/>
+          <p:cNvGraphicFramePr>
+            <a:graphicFrameLocks noChangeAspect="1"/>
+          </p:cNvGraphicFramePr>
+          <p:nvPr>
+            <p:extLst>
+              <p:ext uri="{D42A27DB-BD31-4B8C-83A1-F6EECF244321}">
+                <p14:modId xmlns:p14="http://schemas.microsoft.com/office/powerpoint/2010/main" val="102925809"/>
+              </p:ext>
+            </p:extLst>
+          </p:nvPr>
+        </p:nvGraphicFramePr>
+        <p:xfrm>
+          <a:off x="1447800" y="2916425"/>
+          <a:ext cx="7477125" cy="2636650"/>
+        </p:xfrm>
+        <a:graphic>
+          <a:graphicData uri="http://schemas.openxmlformats.org/presentationml/2006/ole">
+            <mc:AlternateContent xmlns:mc="http://schemas.openxmlformats.org/markup-compatibility/2006">
+              <mc:Choice xmlns:v="urn:schemas-microsoft-com:vml" Requires="v">
+                <p:oleObj spid="_x0000_s1026" name="Image" r:id="rId3" imgW="9571320" imgH="3375720" progId="Photoshop.Image.13">
+                  <p:embed/>
+                </p:oleObj>
+              </mc:Choice>
+              <mc:Fallback>
+                <p:oleObj name="Image" r:id="rId3" imgW="9571320" imgH="3375720" progId="Photoshop.Image.13">
+                  <p:embed/>
+                  <p:pic>
+                    <p:nvPicPr>
+                      <p:cNvPr id="0" name=""/>
+                      <p:cNvPicPr/>
+                      <p:nvPr/>
+                    </p:nvPicPr>
+                    <p:blipFill>
+                      <a:blip r:embed="rId4"/>
+                      <a:stretch>
+                        <a:fillRect/>
+                      </a:stretch>
+                    </p:blipFill>
+                    <p:spPr>
+                      <a:xfrm>
+                        <a:off x="1447800" y="2916425"/>
+                        <a:ext cx="7477125" cy="2636650"/>
+                      </a:xfrm>
+                      <a:prstGeom prst="rect">
+                        <a:avLst/>
+                      </a:prstGeom>
+                    </p:spPr>
+                  </p:pic>
+                </p:oleObj>
+              </mc:Fallback>
+            </mc:AlternateContent>
+          </a:graphicData>
+        </a:graphic>
+      </p:graphicFrame>
+      <p:sp>
+        <p:nvSpPr>
+          <p:cNvPr id="15" name="文本框 14"/>
+          <p:cNvSpPr txBox="1"/>
+          <p:nvPr/>
+        </p:nvSpPr>
+        <p:spPr>
+          <a:xfrm>
+            <a:off x="3714750" y="4733925"/>
+            <a:ext cx="1371600" cy="369332"/>
+          </a:xfrm>
+          <a:prstGeom prst="rect">
+            <a:avLst/>
+          </a:prstGeom>
+          <a:solidFill>
+            <a:srgbClr val="5584C1"/>
+          </a:solidFill>
+        </p:spPr>
+        <p:txBody>
+          <a:bodyPr wrap="square" rtlCol="0">
+            <a:spAutoFit/>
+          </a:bodyPr>
+          <a:lstStyle/>
+          <a:p>
+            <a:r>
+              <a:rPr lang="zh-CN" altLang="en-US" dirty="0" smtClean="0"/>
+              <a:t>第一次填充</a:t>
+            </a:r>
+            <a:endParaRPr lang="zh-CN" altLang="en-US" dirty="0"/>
+          </a:p>
+        </p:txBody>
+      </p:sp>
+      <p:sp>
+        <p:nvSpPr>
+          <p:cNvPr id="16" name="文本框 15"/>
+          <p:cNvSpPr txBox="1"/>
+          <p:nvPr/>
+        </p:nvSpPr>
+        <p:spPr>
+          <a:xfrm>
+            <a:off x="2686050" y="4733925"/>
+            <a:ext cx="676275" cy="369332"/>
+          </a:xfrm>
+          <a:prstGeom prst="rect">
+            <a:avLst/>
+          </a:prstGeom>
+          <a:solidFill>
+            <a:srgbClr val="5584C1"/>
+          </a:solidFill>
+        </p:spPr>
+        <p:txBody>
+          <a:bodyPr wrap="square" rtlCol="0">
+            <a:spAutoFit/>
+          </a:bodyPr>
+          <a:lstStyle/>
+          <a:p>
+            <a:r>
+              <a:rPr lang="en-US" altLang="zh-CN" dirty="0" smtClean="0"/>
+              <a:t>DWT</a:t>
+            </a:r>
+            <a:endParaRPr lang="zh-CN" altLang="en-US" dirty="0"/>
+          </a:p>
+        </p:txBody>
+      </p:sp>
+      <p:sp>
+        <p:nvSpPr>
+          <p:cNvPr id="17" name="文本框 16"/>
+          <p:cNvSpPr txBox="1"/>
+          <p:nvPr/>
+        </p:nvSpPr>
+        <p:spPr>
+          <a:xfrm>
+            <a:off x="6391274" y="4733925"/>
+            <a:ext cx="1495425" cy="369332"/>
+          </a:xfrm>
+          <a:prstGeom prst="rect">
+            <a:avLst/>
+          </a:prstGeom>
+          <a:solidFill>
+            <a:srgbClr val="5584C1"/>
+          </a:solidFill>
+        </p:spPr>
+        <p:txBody>
+          <a:bodyPr wrap="square" rtlCol="0">
+            <a:spAutoFit/>
+          </a:bodyPr>
+          <a:lstStyle/>
+          <a:p>
+            <a:r>
+              <a:rPr lang="zh-CN" altLang="en-US" dirty="0" smtClean="0"/>
+              <a:t>第二次填充</a:t>
+            </a:r>
+            <a:endParaRPr lang="zh-CN" altLang="en-US" dirty="0"/>
+          </a:p>
+        </p:txBody>
+      </p:sp>
+    </p:spTree>
+    <p:extLst>
+      <p:ext uri="{BB962C8B-B14F-4D97-AF65-F5344CB8AC3E}">
+        <p14:creationId xmlns:p14="http://schemas.microsoft.com/office/powerpoint/2010/main" val="1952681217"/>
+      </p:ext>
+    </p:extLst>
+  </p:cSld>
+  <p:clrMapOvr>
+    <a:masterClrMapping/>
+  </p:clrMapOvr>
+</p:sld>
+</file>
+
 <file path=ppt/theme/theme1.xml><?xml version="1.0" encoding="utf-8"?>
 <a:theme xmlns:a="http://schemas.openxmlformats.org/drawingml/2006/main" name="Office 主题">
   <a:themeElements>

</xml_diff>